<commit_message>
Team A weekly progress meeting update
</commit_message>
<xml_diff>
--- a/Team-A/Weekly_Progress_Meeting/0517_Meeting.pptx
+++ b/Team-A/Weekly_Progress_Meeting/0517_Meeting.pptx
@@ -5,7 +5,7 @@
     <p:sldMasterId id="2147483648" r:id="rId1"/>
   </p:sldMasterIdLst>
   <p:sldIdLst>
-    <p:sldId id="322" r:id="rId2"/>
+    <p:sldId id="257" r:id="rId2"/>
     <p:sldId id="329" r:id="rId3"/>
     <p:sldId id="318" r:id="rId4"/>
     <p:sldId id="319" r:id="rId5"/>
@@ -276,7 +276,7 @@
           <a:p>
             <a:fld id="{F1DFE07E-8B53-9849-A657-65069BC6AD27}" type="datetimeFigureOut">
               <a:rPr kumimoji="1" lang="ko-Kore-KR" altLang="en-US" smtClean="0"/>
-              <a:t>2022. 5. 17.</a:t>
+              <a:t>2022. 6. 3.</a:t>
             </a:fld>
             <a:endParaRPr kumimoji="1" lang="ko-Kore-KR" altLang="en-US"/>
           </a:p>
@@ -476,7 +476,7 @@
           <a:p>
             <a:fld id="{F1DFE07E-8B53-9849-A657-65069BC6AD27}" type="datetimeFigureOut">
               <a:rPr kumimoji="1" lang="ko-Kore-KR" altLang="en-US" smtClean="0"/>
-              <a:t>2022. 5. 17.</a:t>
+              <a:t>2022. 6. 3.</a:t>
             </a:fld>
             <a:endParaRPr kumimoji="1" lang="ko-Kore-KR" altLang="en-US"/>
           </a:p>
@@ -686,7 +686,7 @@
           <a:p>
             <a:fld id="{F1DFE07E-8B53-9849-A657-65069BC6AD27}" type="datetimeFigureOut">
               <a:rPr kumimoji="1" lang="ko-Kore-KR" altLang="en-US" smtClean="0"/>
-              <a:t>2022. 5. 17.</a:t>
+              <a:t>2022. 6. 3.</a:t>
             </a:fld>
             <a:endParaRPr kumimoji="1" lang="ko-Kore-KR" altLang="en-US"/>
           </a:p>
@@ -886,7 +886,7 @@
           <a:p>
             <a:fld id="{F1DFE07E-8B53-9849-A657-65069BC6AD27}" type="datetimeFigureOut">
               <a:rPr kumimoji="1" lang="ko-Kore-KR" altLang="en-US" smtClean="0"/>
-              <a:t>2022. 5. 17.</a:t>
+              <a:t>2022. 6. 3.</a:t>
             </a:fld>
             <a:endParaRPr kumimoji="1" lang="ko-Kore-KR" altLang="en-US"/>
           </a:p>
@@ -1162,7 +1162,7 @@
           <a:p>
             <a:fld id="{F1DFE07E-8B53-9849-A657-65069BC6AD27}" type="datetimeFigureOut">
               <a:rPr kumimoji="1" lang="ko-Kore-KR" altLang="en-US" smtClean="0"/>
-              <a:t>2022. 5. 17.</a:t>
+              <a:t>2022. 6. 3.</a:t>
             </a:fld>
             <a:endParaRPr kumimoji="1" lang="ko-Kore-KR" altLang="en-US"/>
           </a:p>
@@ -1430,7 +1430,7 @@
           <a:p>
             <a:fld id="{F1DFE07E-8B53-9849-A657-65069BC6AD27}" type="datetimeFigureOut">
               <a:rPr kumimoji="1" lang="ko-Kore-KR" altLang="en-US" smtClean="0"/>
-              <a:t>2022. 5. 17.</a:t>
+              <a:t>2022. 6. 3.</a:t>
             </a:fld>
             <a:endParaRPr kumimoji="1" lang="ko-Kore-KR" altLang="en-US"/>
           </a:p>
@@ -1845,7 +1845,7 @@
           <a:p>
             <a:fld id="{F1DFE07E-8B53-9849-A657-65069BC6AD27}" type="datetimeFigureOut">
               <a:rPr kumimoji="1" lang="ko-Kore-KR" altLang="en-US" smtClean="0"/>
-              <a:t>2022. 5. 17.</a:t>
+              <a:t>2022. 6. 3.</a:t>
             </a:fld>
             <a:endParaRPr kumimoji="1" lang="ko-Kore-KR" altLang="en-US"/>
           </a:p>
@@ -1987,7 +1987,7 @@
           <a:p>
             <a:fld id="{F1DFE07E-8B53-9849-A657-65069BC6AD27}" type="datetimeFigureOut">
               <a:rPr kumimoji="1" lang="ko-Kore-KR" altLang="en-US" smtClean="0"/>
-              <a:t>2022. 5. 17.</a:t>
+              <a:t>2022. 6. 3.</a:t>
             </a:fld>
             <a:endParaRPr kumimoji="1" lang="ko-Kore-KR" altLang="en-US"/>
           </a:p>
@@ -2100,7 +2100,7 @@
           <a:p>
             <a:fld id="{F1DFE07E-8B53-9849-A657-65069BC6AD27}" type="datetimeFigureOut">
               <a:rPr kumimoji="1" lang="ko-Kore-KR" altLang="en-US" smtClean="0"/>
-              <a:t>2022. 5. 17.</a:t>
+              <a:t>2022. 6. 3.</a:t>
             </a:fld>
             <a:endParaRPr kumimoji="1" lang="ko-Kore-KR" altLang="en-US"/>
           </a:p>
@@ -2413,7 +2413,7 @@
           <a:p>
             <a:fld id="{F1DFE07E-8B53-9849-A657-65069BC6AD27}" type="datetimeFigureOut">
               <a:rPr kumimoji="1" lang="ko-Kore-KR" altLang="en-US" smtClean="0"/>
-              <a:t>2022. 5. 17.</a:t>
+              <a:t>2022. 6. 3.</a:t>
             </a:fld>
             <a:endParaRPr kumimoji="1" lang="ko-Kore-KR" altLang="en-US"/>
           </a:p>
@@ -2702,7 +2702,7 @@
           <a:p>
             <a:fld id="{F1DFE07E-8B53-9849-A657-65069BC6AD27}" type="datetimeFigureOut">
               <a:rPr kumimoji="1" lang="ko-Kore-KR" altLang="en-US" smtClean="0"/>
-              <a:t>2022. 5. 17.</a:t>
+              <a:t>2022. 6. 3.</a:t>
             </a:fld>
             <a:endParaRPr kumimoji="1" lang="ko-Kore-KR" altLang="en-US"/>
           </a:p>
@@ -2945,7 +2945,7 @@
           <a:p>
             <a:fld id="{F1DFE07E-8B53-9849-A657-65069BC6AD27}" type="datetimeFigureOut">
               <a:rPr kumimoji="1" lang="ko-Kore-KR" altLang="en-US" smtClean="0"/>
-              <a:t>2022. 5. 17.</a:t>
+              <a:t>2022. 6. 3.</a:t>
             </a:fld>
             <a:endParaRPr kumimoji="1" lang="ko-Kore-KR" altLang="en-US"/>
           </a:p>
@@ -3364,139 +3364,541 @@
       </p:grpSpPr>
       <p:sp>
         <p:nvSpPr>
-          <p:cNvPr id="2" name="제목 1">
-            <a:extLst>
-              <a:ext uri="{FF2B5EF4-FFF2-40B4-BE49-F238E27FC236}">
-                <a16:creationId xmlns:a16="http://schemas.microsoft.com/office/drawing/2014/main" id="{4BE09D48-21FF-C4FA-C798-417C036CE312}"/>
-              </a:ext>
-            </a:extLst>
-          </p:cNvPr>
-          <p:cNvSpPr>
-            <a:spLocks noGrp="1"/>
-          </p:cNvSpPr>
-          <p:nvPr>
-            <p:ph type="title"/>
-          </p:nvPr>
+          <p:cNvPr id="26" name="직사각형 25">
+            <a:extLst>
+              <a:ext uri="{FF2B5EF4-FFF2-40B4-BE49-F238E27FC236}">
+                <a16:creationId xmlns:a16="http://schemas.microsoft.com/office/drawing/2014/main" id="{0B643648-A614-4C56-9315-9BEF9F6342CA}"/>
+              </a:ext>
+            </a:extLst>
+          </p:cNvPr>
+          <p:cNvSpPr/>
+          <p:nvPr/>
         </p:nvSpPr>
         <p:spPr>
           <a:xfrm>
-            <a:off x="838200" y="1331843"/>
-            <a:ext cx="10515600" cy="2097157"/>
+            <a:off x="-1039" y="10510"/>
+            <a:ext cx="12192000" cy="6857999"/>
           </a:xfrm>
+          <a:prstGeom prst="rect">
+            <a:avLst/>
+          </a:prstGeom>
+          <a:solidFill>
+            <a:schemeClr val="accent5">
+              <a:lumMod val="40000"/>
+              <a:lumOff val="60000"/>
+            </a:schemeClr>
+          </a:solidFill>
+          <a:ln>
+            <a:noFill/>
+          </a:ln>
         </p:spPr>
-        <p:txBody>
-          <a:bodyPr>
-            <a:noAutofit/>
+        <p:style>
+          <a:lnRef idx="2">
+            <a:schemeClr val="accent1">
+              <a:shade val="50000"/>
+            </a:schemeClr>
+          </a:lnRef>
+          <a:fillRef idx="1">
+            <a:schemeClr val="accent1"/>
+          </a:fillRef>
+          <a:effectRef idx="0">
+            <a:schemeClr val="accent1"/>
+          </a:effectRef>
+          <a:fontRef idx="minor">
+            <a:schemeClr val="lt1"/>
+          </a:fontRef>
+        </p:style>
+        <p:txBody>
+          <a:bodyPr rtlCol="0" anchor="ctr"/>
+          <a:lstStyle/>
+          <a:p>
+            <a:pPr algn="ctr"/>
+            <a:endParaRPr lang="ko-KR" altLang="en-US" sz="1600"/>
+          </a:p>
+        </p:txBody>
+      </p:sp>
+      <p:grpSp>
+        <p:nvGrpSpPr>
+          <p:cNvPr id="4" name="그룹 3"/>
+          <p:cNvGrpSpPr/>
+          <p:nvPr/>
+        </p:nvGrpSpPr>
+        <p:grpSpPr>
+          <a:xfrm>
+            <a:off x="3906950" y="2344737"/>
+            <a:ext cx="4191488" cy="2168525"/>
+            <a:chOff x="290512" y="266699"/>
+            <a:chExt cx="11610976" cy="6007101"/>
+          </a:xfrm>
+        </p:grpSpPr>
+        <p:sp>
+          <p:nvSpPr>
+            <p:cNvPr id="6" name="사각형: 둥근 위쪽 모서리 5">
+              <a:extLst>
+                <a:ext uri="{FF2B5EF4-FFF2-40B4-BE49-F238E27FC236}">
+                  <a16:creationId xmlns:a16="http://schemas.microsoft.com/office/drawing/2014/main" id="{335E000A-7070-4A9B-8F8B-C37B96875689}"/>
+                </a:ext>
+              </a:extLst>
+            </p:cNvPr>
+            <p:cNvSpPr/>
+            <p:nvPr/>
+          </p:nvSpPr>
+          <p:spPr>
+            <a:xfrm>
+              <a:off x="290512" y="266699"/>
+              <a:ext cx="11610976" cy="6007101"/>
+            </a:xfrm>
+            <a:prstGeom prst="round2SameRect">
+              <a:avLst>
+                <a:gd name="adj1" fmla="val 1796"/>
+                <a:gd name="adj2" fmla="val 0"/>
+              </a:avLst>
+            </a:prstGeom>
+            <a:solidFill>
+              <a:schemeClr val="tx2">
+                <a:lumMod val="20000"/>
+                <a:lumOff val="80000"/>
+              </a:schemeClr>
+            </a:solidFill>
+            <a:ln w="22225">
+              <a:solidFill>
+                <a:schemeClr val="tx2"/>
+              </a:solidFill>
+            </a:ln>
+            <a:effectLst>
+              <a:outerShdw dist="50800" dir="2700000" algn="tl" rotWithShape="0">
+                <a:prstClr val="black">
+                  <a:alpha val="25000"/>
+                </a:prstClr>
+              </a:outerShdw>
+            </a:effectLst>
+          </p:spPr>
+          <p:style>
+            <a:lnRef idx="2">
+              <a:schemeClr val="accent1">
+                <a:shade val="50000"/>
+              </a:schemeClr>
+            </a:lnRef>
+            <a:fillRef idx="1">
+              <a:schemeClr val="accent1"/>
+            </a:fillRef>
+            <a:effectRef idx="0">
+              <a:schemeClr val="accent1"/>
+            </a:effectRef>
+            <a:fontRef idx="minor">
+              <a:schemeClr val="lt1"/>
+            </a:fontRef>
+          </p:style>
+          <p:txBody>
+            <a:bodyPr rtlCol="0" anchor="ctr"/>
+            <a:lstStyle/>
+            <a:p>
+              <a:pPr algn="ctr"/>
+              <a:endParaRPr lang="ko-KR" altLang="en-US" sz="1600" dirty="0">
+                <a:solidFill>
+                  <a:prstClr val="black">
+                    <a:lumMod val="75000"/>
+                    <a:lumOff val="25000"/>
+                  </a:prstClr>
+                </a:solidFill>
+              </a:endParaRPr>
+            </a:p>
+          </p:txBody>
+        </p:sp>
+        <p:sp>
+          <p:nvSpPr>
+            <p:cNvPr id="7" name="직사각형 6">
+              <a:extLst>
+                <a:ext uri="{FF2B5EF4-FFF2-40B4-BE49-F238E27FC236}">
+                  <a16:creationId xmlns:a16="http://schemas.microsoft.com/office/drawing/2014/main" id="{772DF1CD-ED7F-445D-BE7A-BB139F1DF813}"/>
+                </a:ext>
+              </a:extLst>
+            </p:cNvPr>
+            <p:cNvSpPr/>
+            <p:nvPr/>
+          </p:nvSpPr>
+          <p:spPr>
+            <a:xfrm>
+              <a:off x="490594" y="584200"/>
+              <a:ext cx="11210813" cy="5689600"/>
+            </a:xfrm>
+            <a:prstGeom prst="rect">
+              <a:avLst/>
+            </a:prstGeom>
+            <a:solidFill>
+              <a:schemeClr val="bg1"/>
+            </a:solidFill>
+            <a:ln w="22225">
+              <a:solidFill>
+                <a:schemeClr val="tx2"/>
+              </a:solidFill>
+            </a:ln>
+            <a:effectLst/>
+          </p:spPr>
+          <p:style>
+            <a:lnRef idx="2">
+              <a:schemeClr val="accent1">
+                <a:shade val="50000"/>
+              </a:schemeClr>
+            </a:lnRef>
+            <a:fillRef idx="1">
+              <a:schemeClr val="accent1"/>
+            </a:fillRef>
+            <a:effectRef idx="0">
+              <a:schemeClr val="accent1"/>
+            </a:effectRef>
+            <a:fontRef idx="minor">
+              <a:schemeClr val="lt1"/>
+            </a:fontRef>
+          </p:style>
+          <p:txBody>
+            <a:bodyPr rtlCol="0" anchor="ctr"/>
+            <a:lstStyle/>
+            <a:p>
+              <a:pPr algn="ctr"/>
+              <a:endParaRPr lang="ko-KR" altLang="en-US" sz="1600" dirty="0">
+                <a:solidFill>
+                  <a:prstClr val="black">
+                    <a:lumMod val="75000"/>
+                    <a:lumOff val="25000"/>
+                  </a:prstClr>
+                </a:solidFill>
+              </a:endParaRPr>
+            </a:p>
+          </p:txBody>
+        </p:sp>
+      </p:grpSp>
+      <p:grpSp>
+        <p:nvGrpSpPr>
+          <p:cNvPr id="9" name="그룹 8"/>
+          <p:cNvGrpSpPr/>
+          <p:nvPr/>
+        </p:nvGrpSpPr>
+        <p:grpSpPr>
+          <a:xfrm>
+            <a:off x="3665649" y="4513262"/>
+            <a:ext cx="4672013" cy="180262"/>
+            <a:chOff x="100012" y="6273801"/>
+            <a:chExt cx="11991976" cy="342900"/>
+          </a:xfrm>
+        </p:grpSpPr>
+        <p:sp>
+          <p:nvSpPr>
+            <p:cNvPr id="8" name="사각형: 둥근 위쪽 모서리 7">
+              <a:extLst>
+                <a:ext uri="{FF2B5EF4-FFF2-40B4-BE49-F238E27FC236}">
+                  <a16:creationId xmlns:a16="http://schemas.microsoft.com/office/drawing/2014/main" id="{E53B37FA-802F-4BFF-81B0-AFB12F792ED2}"/>
+                </a:ext>
+              </a:extLst>
+            </p:cNvPr>
+            <p:cNvSpPr/>
+            <p:nvPr/>
+          </p:nvSpPr>
+          <p:spPr>
+            <a:xfrm>
+              <a:off x="100012" y="6273801"/>
+              <a:ext cx="11991976" cy="342900"/>
+            </a:xfrm>
+            <a:prstGeom prst="round2SameRect">
+              <a:avLst>
+                <a:gd name="adj1" fmla="val 1796"/>
+                <a:gd name="adj2" fmla="val 50000"/>
+              </a:avLst>
+            </a:prstGeom>
+            <a:solidFill>
+              <a:schemeClr val="tx2">
+                <a:lumMod val="40000"/>
+                <a:lumOff val="60000"/>
+              </a:schemeClr>
+            </a:solidFill>
+            <a:ln w="22225">
+              <a:solidFill>
+                <a:schemeClr val="tx2"/>
+              </a:solidFill>
+            </a:ln>
+            <a:effectLst>
+              <a:outerShdw dist="76200" dir="5400000" algn="t" rotWithShape="0">
+                <a:prstClr val="black">
+                  <a:alpha val="20000"/>
+                </a:prstClr>
+              </a:outerShdw>
+            </a:effectLst>
+          </p:spPr>
+          <p:style>
+            <a:lnRef idx="2">
+              <a:schemeClr val="accent1">
+                <a:shade val="50000"/>
+              </a:schemeClr>
+            </a:lnRef>
+            <a:fillRef idx="1">
+              <a:schemeClr val="accent1"/>
+            </a:fillRef>
+            <a:effectRef idx="0">
+              <a:schemeClr val="accent1"/>
+            </a:effectRef>
+            <a:fontRef idx="minor">
+              <a:schemeClr val="lt1"/>
+            </a:fontRef>
+          </p:style>
+          <p:txBody>
+            <a:bodyPr rtlCol="0" anchor="ctr"/>
+            <a:lstStyle/>
+            <a:p>
+              <a:pPr algn="ctr"/>
+              <a:endParaRPr lang="ko-KR" altLang="en-US" sz="1600" dirty="0">
+                <a:solidFill>
+                  <a:prstClr val="black">
+                    <a:lumMod val="75000"/>
+                    <a:lumOff val="25000"/>
+                  </a:prstClr>
+                </a:solidFill>
+              </a:endParaRPr>
+            </a:p>
+          </p:txBody>
+        </p:sp>
+        <p:sp>
+          <p:nvSpPr>
+            <p:cNvPr id="10" name="사각형: 둥근 위쪽 모서리 9">
+              <a:extLst>
+                <a:ext uri="{FF2B5EF4-FFF2-40B4-BE49-F238E27FC236}">
+                  <a16:creationId xmlns:a16="http://schemas.microsoft.com/office/drawing/2014/main" id="{72EE7024-12EA-4ACE-8475-89B9FA38EDFA}"/>
+                </a:ext>
+              </a:extLst>
+            </p:cNvPr>
+            <p:cNvSpPr/>
+            <p:nvPr/>
+          </p:nvSpPr>
+          <p:spPr>
+            <a:xfrm>
+              <a:off x="5447506" y="6273801"/>
+              <a:ext cx="1296988" cy="152400"/>
+            </a:xfrm>
+            <a:prstGeom prst="round2SameRect">
+              <a:avLst>
+                <a:gd name="adj1" fmla="val 1796"/>
+                <a:gd name="adj2" fmla="val 50000"/>
+              </a:avLst>
+            </a:prstGeom>
+            <a:solidFill>
+              <a:schemeClr val="bg1">
+                <a:lumMod val="85000"/>
+              </a:schemeClr>
+            </a:solidFill>
+            <a:ln w="22225">
+              <a:solidFill>
+                <a:schemeClr val="tx2"/>
+              </a:solidFill>
+            </a:ln>
+            <a:effectLst/>
+          </p:spPr>
+          <p:style>
+            <a:lnRef idx="2">
+              <a:schemeClr val="accent1">
+                <a:shade val="50000"/>
+              </a:schemeClr>
+            </a:lnRef>
+            <a:fillRef idx="1">
+              <a:schemeClr val="accent1"/>
+            </a:fillRef>
+            <a:effectRef idx="0">
+              <a:schemeClr val="accent1"/>
+            </a:effectRef>
+            <a:fontRef idx="minor">
+              <a:schemeClr val="lt1"/>
+            </a:fontRef>
+          </p:style>
+          <p:txBody>
+            <a:bodyPr rtlCol="0" anchor="ctr"/>
+            <a:lstStyle/>
+            <a:p>
+              <a:pPr algn="ctr"/>
+              <a:endParaRPr lang="ko-KR" altLang="en-US" sz="1600" dirty="0">
+                <a:solidFill>
+                  <a:prstClr val="black">
+                    <a:lumMod val="75000"/>
+                    <a:lumOff val="25000"/>
+                  </a:prstClr>
+                </a:solidFill>
+              </a:endParaRPr>
+            </a:p>
+          </p:txBody>
+        </p:sp>
+      </p:grpSp>
+      <p:sp>
+        <p:nvSpPr>
+          <p:cNvPr id="12" name="직사각형 11">
+            <a:extLst>
+              <a:ext uri="{FF2B5EF4-FFF2-40B4-BE49-F238E27FC236}">
+                <a16:creationId xmlns:a16="http://schemas.microsoft.com/office/drawing/2014/main" id="{3306E199-7A3B-42EE-8BEE-EB2E661BD2BC}"/>
+              </a:ext>
+            </a:extLst>
+          </p:cNvPr>
+          <p:cNvSpPr/>
+          <p:nvPr/>
+        </p:nvSpPr>
+        <p:spPr>
+          <a:xfrm>
+            <a:off x="3979178" y="2459353"/>
+            <a:ext cx="4047032" cy="456039"/>
+          </a:xfrm>
+          <a:prstGeom prst="rect">
+            <a:avLst/>
+          </a:prstGeom>
+          <a:solidFill>
+            <a:schemeClr val="accent5"/>
+          </a:solidFill>
+          <a:ln w="22225">
+            <a:solidFill>
+              <a:schemeClr val="tx2"/>
+            </a:solidFill>
+          </a:ln>
+          <a:effectLst/>
+        </p:spPr>
+        <p:style>
+          <a:lnRef idx="2">
+            <a:schemeClr val="accent1">
+              <a:shade val="50000"/>
+            </a:schemeClr>
+          </a:lnRef>
+          <a:fillRef idx="1">
+            <a:schemeClr val="accent1"/>
+          </a:fillRef>
+          <a:effectRef idx="0">
+            <a:schemeClr val="accent1"/>
+          </a:effectRef>
+          <a:fontRef idx="minor">
+            <a:schemeClr val="lt1"/>
+          </a:fontRef>
+        </p:style>
+        <p:txBody>
+          <a:bodyPr rtlCol="0" anchor="ctr"/>
+          <a:lstStyle/>
+          <a:p>
+            <a:pPr algn="ctr" latinLnBrk="0">
+              <a:defRPr/>
+            </a:pPr>
+            <a:r>
+              <a:rPr lang="en-US" altLang="ko-KR" sz="2000" kern="0" dirty="0">
+                <a:solidFill>
+                  <a:prstClr val="white"/>
+                </a:solidFill>
+                <a:latin typeface="원신한 Bold" panose="020B0803000000000000" pitchFamily="50" charset="-127"/>
+                <a:ea typeface="원신한 Bold" panose="020B0803000000000000" pitchFamily="50" charset="-127"/>
+              </a:rPr>
+              <a:t>Team: </a:t>
+            </a:r>
+            <a:r>
+              <a:rPr lang="ko-KR" altLang="en-US" sz="2000" kern="0" dirty="0" err="1">
+                <a:solidFill>
+                  <a:prstClr val="white"/>
+                </a:solidFill>
+                <a:latin typeface="원신한 Bold" panose="020B0803000000000000" pitchFamily="50" charset="-127"/>
+                <a:ea typeface="원신한 Bold" panose="020B0803000000000000" pitchFamily="50" charset="-127"/>
+              </a:rPr>
+              <a:t>이청수와</a:t>
+            </a:r>
+            <a:r>
+              <a:rPr lang="ko-KR" altLang="en-US" sz="2000" kern="0" dirty="0">
+                <a:solidFill>
+                  <a:prstClr val="white"/>
+                </a:solidFill>
+                <a:latin typeface="원신한 Bold" panose="020B0803000000000000" pitchFamily="50" charset="-127"/>
+                <a:ea typeface="원신한 Bold" panose="020B0803000000000000" pitchFamily="50" charset="-127"/>
+              </a:rPr>
+              <a:t> 아이들</a:t>
+            </a:r>
+          </a:p>
+        </p:txBody>
+      </p:sp>
+      <p:sp>
+        <p:nvSpPr>
+          <p:cNvPr id="14" name="직사각형 13"/>
+          <p:cNvSpPr/>
+          <p:nvPr/>
+        </p:nvSpPr>
+        <p:spPr>
+          <a:xfrm>
+            <a:off x="4060935" y="3240513"/>
+            <a:ext cx="3967753" cy="769441"/>
+          </a:xfrm>
+          <a:prstGeom prst="rect">
+            <a:avLst/>
+          </a:prstGeom>
+        </p:spPr>
+        <p:txBody>
+          <a:bodyPr wrap="none">
+            <a:spAutoFit/>
           </a:bodyPr>
           <a:lstStyle/>
           <a:p>
-            <a:pPr algn="ctr"/>
-            <a:r>
-              <a:rPr kumimoji="1" lang="ko-KR" altLang="en-US" sz="5000" b="1" dirty="0" err="1">
-                <a:latin typeface="Malgun Gothic" panose="020B0503020000020004" pitchFamily="34" charset="-127"/>
-                <a:ea typeface="Malgun Gothic" panose="020B0503020000020004" pitchFamily="34" charset="-127"/>
-              </a:rPr>
-              <a:t>캡스톤디자인</a:t>
-            </a:r>
-            <a:br>
-              <a:rPr kumimoji="1" lang="en-US" altLang="ko-KR" sz="5000" dirty="0">
-                <a:latin typeface="Malgun Gothic" panose="020B0503020000020004" pitchFamily="34" charset="-127"/>
-                <a:ea typeface="Malgun Gothic" panose="020B0503020000020004" pitchFamily="34" charset="-127"/>
-              </a:rPr>
-            </a:br>
-            <a:r>
-              <a:rPr kumimoji="1" lang="en-US" altLang="ko-Kore-KR" sz="5000" dirty="0">
-                <a:latin typeface="Malgun Gothic" panose="020B0503020000020004" pitchFamily="34" charset="-127"/>
-                <a:ea typeface="Malgun Gothic" panose="020B0503020000020004" pitchFamily="34" charset="-127"/>
-              </a:rPr>
-              <a:t>Weekly Progress Presentation</a:t>
-            </a:r>
-            <a:endParaRPr kumimoji="1" lang="ko-Kore-KR" altLang="en-US" sz="5000" dirty="0">
-              <a:latin typeface="Malgun Gothic" panose="020B0503020000020004" pitchFamily="34" charset="-127"/>
-              <a:ea typeface="Malgun Gothic" panose="020B0503020000020004" pitchFamily="34" charset="-127"/>
-            </a:endParaRPr>
-          </a:p>
-        </p:txBody>
-      </p:sp>
-      <p:sp>
-        <p:nvSpPr>
-          <p:cNvPr id="3" name="내용 개체 틀 2">
-            <a:extLst>
-              <a:ext uri="{FF2B5EF4-FFF2-40B4-BE49-F238E27FC236}">
-                <a16:creationId xmlns:a16="http://schemas.microsoft.com/office/drawing/2014/main" id="{6D571000-52F0-B1FA-7C04-1155BEE0CAD2}"/>
-              </a:ext>
-            </a:extLst>
-          </p:cNvPr>
-          <p:cNvSpPr>
-            <a:spLocks noGrp="1"/>
-          </p:cNvSpPr>
-          <p:nvPr>
-            <p:ph idx="1"/>
-          </p:nvPr>
+            <a:pPr algn="ctr" latinLnBrk="0">
+              <a:defRPr/>
+            </a:pPr>
+            <a:r>
+              <a:rPr lang="ko-KR" altLang="en-US" sz="4400" kern="0" dirty="0">
+                <a:solidFill>
+                  <a:prstClr val="white">
+                    <a:lumMod val="75000"/>
+                  </a:prstClr>
+                </a:solidFill>
+                <a:latin typeface="원신한 Bold" panose="020B0803000000000000" pitchFamily="50" charset="-127"/>
+                <a:ea typeface="원신한 Bold" panose="020B0803000000000000" pitchFamily="50" charset="-127"/>
+              </a:rPr>
+              <a:t>진행 사항 발표</a:t>
+            </a:r>
+          </a:p>
+        </p:txBody>
+      </p:sp>
+      <p:sp>
+        <p:nvSpPr>
+          <p:cNvPr id="11" name="직사각형 10">
+            <a:extLst>
+              <a:ext uri="{FF2B5EF4-FFF2-40B4-BE49-F238E27FC236}">
+                <a16:creationId xmlns:a16="http://schemas.microsoft.com/office/drawing/2014/main" id="{37D5CAC1-3618-8E4D-98F0-55DF428C1DF4}"/>
+              </a:ext>
+            </a:extLst>
+          </p:cNvPr>
+          <p:cNvSpPr/>
+          <p:nvPr/>
         </p:nvSpPr>
         <p:spPr>
           <a:xfrm>
-            <a:off x="838200" y="3563937"/>
-            <a:ext cx="10515600" cy="2190820"/>
+            <a:off x="4678897" y="4969301"/>
+            <a:ext cx="2731838" cy="769441"/>
           </a:xfrm>
+          <a:prstGeom prst="rect">
+            <a:avLst/>
+          </a:prstGeom>
         </p:spPr>
         <p:txBody>
-          <a:bodyPr>
-            <a:normAutofit/>
+          <a:bodyPr wrap="none">
+            <a:spAutoFit/>
           </a:bodyPr>
           <a:lstStyle/>
           <a:p>
-            <a:pPr marL="0" indent="0" algn="ctr">
-              <a:lnSpc>
-                <a:spcPct val="150000"/>
-              </a:lnSpc>
-              <a:buNone/>
+            <a:pPr algn="ctr" latinLnBrk="0">
+              <a:defRPr/>
             </a:pPr>
             <a:r>
-              <a:rPr kumimoji="1" lang="en-US" altLang="ko-KR" sz="3500" dirty="0">
-                <a:latin typeface="Malgun Gothic" panose="020B0503020000020004" pitchFamily="34" charset="-127"/>
-                <a:ea typeface="Malgun Gothic" panose="020B0503020000020004" pitchFamily="34" charset="-127"/>
-              </a:rPr>
-              <a:t>[13</a:t>
-            </a:r>
-            <a:r>
-              <a:rPr kumimoji="1" lang="ko-KR" altLang="en-US" sz="3500" dirty="0">
-                <a:latin typeface="Malgun Gothic" panose="020B0503020000020004" pitchFamily="34" charset="-127"/>
-                <a:ea typeface="Malgun Gothic" panose="020B0503020000020004" pitchFamily="34" charset="-127"/>
-              </a:rPr>
-              <a:t>주차</a:t>
-            </a:r>
-            <a:r>
-              <a:rPr kumimoji="1" lang="en-US" altLang="ko-KR" sz="3500" dirty="0">
-                <a:latin typeface="Malgun Gothic" panose="020B0503020000020004" pitchFamily="34" charset="-127"/>
-                <a:ea typeface="Malgun Gothic" panose="020B0503020000020004" pitchFamily="34" charset="-127"/>
-              </a:rPr>
-              <a:t>]</a:t>
-            </a:r>
-            <a:r>
-              <a:rPr kumimoji="1" lang="ko-KR" altLang="en-US" sz="3500" dirty="0">
-                <a:latin typeface="Malgun Gothic" panose="020B0503020000020004" pitchFamily="34" charset="-127"/>
-                <a:ea typeface="Malgun Gothic" panose="020B0503020000020004" pitchFamily="34" charset="-127"/>
-              </a:rPr>
-              <a:t> </a:t>
-            </a:r>
-            <a:r>
-              <a:rPr kumimoji="1" lang="en-US" altLang="ko-Kore-KR" sz="3500" dirty="0">
-                <a:latin typeface="Malgun Gothic" panose="020B0503020000020004" pitchFamily="34" charset="-127"/>
-                <a:ea typeface="Malgun Gothic" panose="020B0503020000020004" pitchFamily="34" charset="-127"/>
-              </a:rPr>
-              <a:t>A</a:t>
-            </a:r>
-            <a:r>
-              <a:rPr kumimoji="1" lang="ko-KR" altLang="en-US" sz="3500" dirty="0">
-                <a:latin typeface="Malgun Gothic" panose="020B0503020000020004" pitchFamily="34" charset="-127"/>
-                <a:ea typeface="Malgun Gothic" panose="020B0503020000020004" pitchFamily="34" charset="-127"/>
-              </a:rPr>
-              <a:t>팀</a:t>
-            </a:r>
-            <a:endParaRPr kumimoji="1" lang="ko-Kore-KR" altLang="en-US" sz="3500" dirty="0">
-              <a:latin typeface="Malgun Gothic" panose="020B0503020000020004" pitchFamily="34" charset="-127"/>
-              <a:ea typeface="Malgun Gothic" panose="020B0503020000020004" pitchFamily="34" charset="-127"/>
+              <a:rPr lang="en-US" altLang="ko-KR" sz="4400" kern="0" dirty="0">
+                <a:solidFill>
+                  <a:schemeClr val="bg1">
+                    <a:lumMod val="50000"/>
+                  </a:schemeClr>
+                </a:solidFill>
+                <a:latin typeface="원신한 Bold" panose="020B0803000000000000" pitchFamily="50" charset="-127"/>
+                <a:ea typeface="원신한 Bold" panose="020B0803000000000000" pitchFamily="50" charset="-127"/>
+              </a:rPr>
+              <a:t>2022.5.17.</a:t>
+            </a:r>
+            <a:endParaRPr lang="ko-KR" altLang="en-US" sz="4400" kern="0" dirty="0">
+              <a:solidFill>
+                <a:schemeClr val="bg1">
+                  <a:lumMod val="50000"/>
+                </a:schemeClr>
+              </a:solidFill>
+              <a:latin typeface="원신한 Bold" panose="020B0803000000000000" pitchFamily="50" charset="-127"/>
+              <a:ea typeface="원신한 Bold" panose="020B0803000000000000" pitchFamily="50" charset="-127"/>
             </a:endParaRPr>
           </a:p>
         </p:txBody>
@@ -3504,7 +3906,7 @@
     </p:spTree>
     <p:extLst>
       <p:ext uri="{BB962C8B-B14F-4D97-AF65-F5344CB8AC3E}">
-        <p14:creationId xmlns:p14="http://schemas.microsoft.com/office/powerpoint/2010/main" val="3440958629"/>
+        <p14:creationId xmlns:p14="http://schemas.microsoft.com/office/powerpoint/2010/main" val="569786843"/>
       </p:ext>
     </p:extLst>
   </p:cSld>

</xml_diff>